<commit_message>
New signup - Terms of Use and User Data
</commit_message>
<xml_diff>
--- a/project management/WGACA Logo.pptx
+++ b/project management/WGACA Logo.pptx
@@ -7,6 +7,8 @@
   <p:sldIdLst>
     <p:sldId id="259" r:id="rId2"/>
     <p:sldId id="260" r:id="rId3"/>
+    <p:sldId id="261" r:id="rId4"/>
+    <p:sldId id="262" r:id="rId5"/>
   </p:sldIdLst>
   <p:sldSz cx="9906000" cy="6858000" type="A4"/>
   <p:notesSz cx="6858000" cy="9144000"/>
@@ -117,6 +119,7 @@
 <p1510:revInfo xmlns:a="http://schemas.openxmlformats.org/drawingml/2006/main" xmlns:r="http://schemas.openxmlformats.org/officeDocument/2006/relationships" xmlns:p1510="http://schemas.microsoft.com/office/powerpoint/2015/10/main">
   <p1510:revLst>
     <p1510:client id="{AA5612E0-3683-4058-9FE4-346AE921324A}" v="181" dt="2020-04-03T10:19:24.131"/>
+    <p1510:client id="{D90D2214-8DAC-42B5-8439-B35FC0752A3F}" v="19" dt="2020-04-03T15:13:48.582"/>
   </p1510:revLst>
 </p1510:revInfo>
 </file>
@@ -548,6 +551,173 @@
             <pc:docMk/>
             <pc:sldMk cId="2041308292" sldId="260"/>
             <ac:picMk id="20" creationId="{FA6C185A-39BE-40E8-A8E1-FF2BEC142394}"/>
+          </ac:picMkLst>
+        </pc:picChg>
+      </pc:sldChg>
+    </pc:docChg>
+  </pc:docChgLst>
+  <pc:docChgLst>
+    <pc:chgData name="Peter Fison" userId="414d6edd842eada8" providerId="LiveId" clId="{D90D2214-8DAC-42B5-8439-B35FC0752A3F}"/>
+    <pc:docChg chg="undo custSel addSld modSld">
+      <pc:chgData name="Peter Fison" userId="414d6edd842eada8" providerId="LiveId" clId="{D90D2214-8DAC-42B5-8439-B35FC0752A3F}" dt="2020-04-03T15:13:50.367" v="48" actId="1076"/>
+      <pc:docMkLst>
+        <pc:docMk/>
+      </pc:docMkLst>
+      <pc:sldChg chg="addSp delSp modSp add">
+        <pc:chgData name="Peter Fison" userId="414d6edd842eada8" providerId="LiveId" clId="{D90D2214-8DAC-42B5-8439-B35FC0752A3F}" dt="2020-04-03T15:13:50.367" v="48" actId="1076"/>
+        <pc:sldMkLst>
+          <pc:docMk/>
+          <pc:sldMk cId="3758216428" sldId="261"/>
+        </pc:sldMkLst>
+        <pc:spChg chg="add mod ord">
+          <ac:chgData name="Peter Fison" userId="414d6edd842eada8" providerId="LiveId" clId="{D90D2214-8DAC-42B5-8439-B35FC0752A3F}" dt="2020-04-03T15:12:41.170" v="38" actId="1076"/>
+          <ac:spMkLst>
+            <pc:docMk/>
+            <pc:sldMk cId="3758216428" sldId="261"/>
+            <ac:spMk id="6" creationId="{CFCBECC7-7B6F-411D-9D10-F51EDF209551}"/>
+          </ac:spMkLst>
+        </pc:spChg>
+        <pc:spChg chg="add mod ord">
+          <ac:chgData name="Peter Fison" userId="414d6edd842eada8" providerId="LiveId" clId="{D90D2214-8DAC-42B5-8439-B35FC0752A3F}" dt="2020-04-03T15:11:26.748" v="22" actId="167"/>
+          <ac:spMkLst>
+            <pc:docMk/>
+            <pc:sldMk cId="3758216428" sldId="261"/>
+            <ac:spMk id="9" creationId="{2B000735-6B8F-4CC7-8446-F3F270A7CFF6}"/>
+          </ac:spMkLst>
+        </pc:spChg>
+        <pc:spChg chg="add mod ord">
+          <ac:chgData name="Peter Fison" userId="414d6edd842eada8" providerId="LiveId" clId="{D90D2214-8DAC-42B5-8439-B35FC0752A3F}" dt="2020-04-03T15:11:21.768" v="21" actId="167"/>
+          <ac:spMkLst>
+            <pc:docMk/>
+            <pc:sldMk cId="3758216428" sldId="261"/>
+            <ac:spMk id="10" creationId="{C5685E09-78F1-461F-8D7B-F892C11C3068}"/>
+          </ac:spMkLst>
+        </pc:spChg>
+        <pc:spChg chg="add mod ord">
+          <ac:chgData name="Peter Fison" userId="414d6edd842eada8" providerId="LiveId" clId="{D90D2214-8DAC-42B5-8439-B35FC0752A3F}" dt="2020-04-03T15:11:54.633" v="28" actId="171"/>
+          <ac:spMkLst>
+            <pc:docMk/>
+            <pc:sldMk cId="3758216428" sldId="261"/>
+            <ac:spMk id="11" creationId="{84A2BF55-5A5E-4A3C-AE42-6F4FB142A34A}"/>
+          </ac:spMkLst>
+        </pc:spChg>
+        <pc:spChg chg="add mod ord">
+          <ac:chgData name="Peter Fison" userId="414d6edd842eada8" providerId="LiveId" clId="{D90D2214-8DAC-42B5-8439-B35FC0752A3F}" dt="2020-04-03T15:12:20.528" v="34" actId="171"/>
+          <ac:spMkLst>
+            <pc:docMk/>
+            <pc:sldMk cId="3758216428" sldId="261"/>
+            <ac:spMk id="12" creationId="{A421906B-A2B0-4D4C-B548-B44317C4DDA6}"/>
+          </ac:spMkLst>
+        </pc:spChg>
+        <pc:spChg chg="add mod ord">
+          <ac:chgData name="Peter Fison" userId="414d6edd842eada8" providerId="LiveId" clId="{D90D2214-8DAC-42B5-8439-B35FC0752A3F}" dt="2020-04-03T15:12:36.463" v="37" actId="171"/>
+          <ac:spMkLst>
+            <pc:docMk/>
+            <pc:sldMk cId="3758216428" sldId="261"/>
+            <ac:spMk id="13" creationId="{AA938F19-0969-46FB-84DB-404A50D57D5E}"/>
+          </ac:spMkLst>
+        </pc:spChg>
+        <pc:picChg chg="add del mod">
+          <ac:chgData name="Peter Fison" userId="414d6edd842eada8" providerId="LiveId" clId="{D90D2214-8DAC-42B5-8439-B35FC0752A3F}" dt="2020-04-03T15:08:49.271" v="4" actId="478"/>
+          <ac:picMkLst>
+            <pc:docMk/>
+            <pc:sldMk cId="3758216428" sldId="261"/>
+            <ac:picMk id="3" creationId="{9E4EE58D-DCD3-4AB5-B4D3-AE0F5EB40EEC}"/>
+          </ac:picMkLst>
+        </pc:picChg>
+        <pc:picChg chg="add del mod">
+          <ac:chgData name="Peter Fison" userId="414d6edd842eada8" providerId="LiveId" clId="{D90D2214-8DAC-42B5-8439-B35FC0752A3F}" dt="2020-04-03T15:10:24.058" v="11" actId="478"/>
+          <ac:picMkLst>
+            <pc:docMk/>
+            <pc:sldMk cId="3758216428" sldId="261"/>
+            <ac:picMk id="5" creationId="{A4ABDCA2-954E-4DED-9CC2-86501668CFAF}"/>
+          </ac:picMkLst>
+        </pc:picChg>
+        <pc:picChg chg="add mod">
+          <ac:chgData name="Peter Fison" userId="414d6edd842eada8" providerId="LiveId" clId="{D90D2214-8DAC-42B5-8439-B35FC0752A3F}" dt="2020-04-03T15:10:43.230" v="15"/>
+          <ac:picMkLst>
+            <pc:docMk/>
+            <pc:sldMk cId="3758216428" sldId="261"/>
+            <ac:picMk id="8" creationId="{A5A6209D-92D9-45CC-AC59-9B7A2669D144}"/>
+          </ac:picMkLst>
+        </pc:picChg>
+        <pc:picChg chg="add mod">
+          <ac:chgData name="Peter Fison" userId="414d6edd842eada8" providerId="LiveId" clId="{D90D2214-8DAC-42B5-8439-B35FC0752A3F}" dt="2020-04-03T15:13:41.895" v="46" actId="1076"/>
+          <ac:picMkLst>
+            <pc:docMk/>
+            <pc:sldMk cId="3758216428" sldId="261"/>
+            <ac:picMk id="14" creationId="{B7BAE039-AE2A-4DAE-9178-55A899F1A556}"/>
+          </ac:picMkLst>
+        </pc:picChg>
+        <pc:picChg chg="add mod">
+          <ac:chgData name="Peter Fison" userId="414d6edd842eada8" providerId="LiveId" clId="{D90D2214-8DAC-42B5-8439-B35FC0752A3F}" dt="2020-04-03T15:13:50.367" v="48" actId="1076"/>
+          <ac:picMkLst>
+            <pc:docMk/>
+            <pc:sldMk cId="3758216428" sldId="261"/>
+            <ac:picMk id="15" creationId="{868F44AE-F1E4-45DF-86E6-5EDC30F6F344}"/>
+          </ac:picMkLst>
+        </pc:picChg>
+      </pc:sldChg>
+      <pc:sldChg chg="addSp delSp add">
+        <pc:chgData name="Peter Fison" userId="414d6edd842eada8" providerId="LiveId" clId="{D90D2214-8DAC-42B5-8439-B35FC0752A3F}" dt="2020-04-03T15:13:28.439" v="43" actId="21"/>
+        <pc:sldMkLst>
+          <pc:docMk/>
+          <pc:sldMk cId="2710539114" sldId="262"/>
+        </pc:sldMkLst>
+        <pc:spChg chg="add del">
+          <ac:chgData name="Peter Fison" userId="414d6edd842eada8" providerId="LiveId" clId="{D90D2214-8DAC-42B5-8439-B35FC0752A3F}" dt="2020-04-03T15:12:56.731" v="41"/>
+          <ac:spMkLst>
+            <pc:docMk/>
+            <pc:sldMk cId="2710539114" sldId="262"/>
+            <ac:spMk id="2" creationId="{8E28C1B1-79B3-4D12-95E8-F23892712D3F}"/>
+          </ac:spMkLst>
+        </pc:spChg>
+        <pc:spChg chg="add del">
+          <ac:chgData name="Peter Fison" userId="414d6edd842eada8" providerId="LiveId" clId="{D90D2214-8DAC-42B5-8439-B35FC0752A3F}" dt="2020-04-03T15:12:56.731" v="41"/>
+          <ac:spMkLst>
+            <pc:docMk/>
+            <pc:sldMk cId="2710539114" sldId="262"/>
+            <ac:spMk id="3" creationId="{0CFF33B3-DDD3-4032-BB87-A9B06C074C2E}"/>
+          </ac:spMkLst>
+        </pc:spChg>
+        <pc:spChg chg="add del">
+          <ac:chgData name="Peter Fison" userId="414d6edd842eada8" providerId="LiveId" clId="{D90D2214-8DAC-42B5-8439-B35FC0752A3F}" dt="2020-04-03T15:12:56.731" v="41"/>
+          <ac:spMkLst>
+            <pc:docMk/>
+            <pc:sldMk cId="2710539114" sldId="262"/>
+            <ac:spMk id="4" creationId="{19AE931C-D4EF-4182-B033-B9F3ABABF08E}"/>
+          </ac:spMkLst>
+        </pc:spChg>
+        <pc:spChg chg="add del">
+          <ac:chgData name="Peter Fison" userId="414d6edd842eada8" providerId="LiveId" clId="{D90D2214-8DAC-42B5-8439-B35FC0752A3F}" dt="2020-04-03T15:12:56.731" v="41"/>
+          <ac:spMkLst>
+            <pc:docMk/>
+            <pc:sldMk cId="2710539114" sldId="262"/>
+            <ac:spMk id="5" creationId="{73348DF8-A421-4002-82B2-0BD89E465F4B}"/>
+          </ac:spMkLst>
+        </pc:spChg>
+        <pc:spChg chg="add del">
+          <ac:chgData name="Peter Fison" userId="414d6edd842eada8" providerId="LiveId" clId="{D90D2214-8DAC-42B5-8439-B35FC0752A3F}" dt="2020-04-03T15:12:56.731" v="41"/>
+          <ac:spMkLst>
+            <pc:docMk/>
+            <pc:sldMk cId="2710539114" sldId="262"/>
+            <ac:spMk id="6" creationId="{19B91BD4-74B7-4CAD-A53D-86FCDF53AC5F}"/>
+          </ac:spMkLst>
+        </pc:spChg>
+        <pc:picChg chg="add del">
+          <ac:chgData name="Peter Fison" userId="414d6edd842eada8" providerId="LiveId" clId="{D90D2214-8DAC-42B5-8439-B35FC0752A3F}" dt="2020-04-03T15:12:56.731" v="41"/>
+          <ac:picMkLst>
+            <pc:docMk/>
+            <pc:sldMk cId="2710539114" sldId="262"/>
+            <ac:picMk id="7" creationId="{E9DC0227-9E92-4BAC-BD46-3AB69C49713F}"/>
+          </ac:picMkLst>
+        </pc:picChg>
+        <pc:picChg chg="add del">
+          <ac:chgData name="Peter Fison" userId="414d6edd842eada8" providerId="LiveId" clId="{D90D2214-8DAC-42B5-8439-B35FC0752A3F}" dt="2020-04-03T15:13:28.439" v="43" actId="21"/>
+          <ac:picMkLst>
+            <pc:docMk/>
+            <pc:sldMk cId="2710539114" sldId="262"/>
+            <ac:picMk id="8" creationId="{06802559-089C-406D-943D-83565BA54770}"/>
           </ac:picMkLst>
         </pc:picChg>
       </pc:sldChg>
@@ -3866,6 +4036,478 @@
 </p:sld>
 </file>
 
+<file path=ppt/slides/slide3.xml><?xml version="1.0" encoding="utf-8"?>
+<p:sld xmlns:a="http://schemas.openxmlformats.org/drawingml/2006/main" xmlns:r="http://schemas.openxmlformats.org/officeDocument/2006/relationships" xmlns:p="http://schemas.openxmlformats.org/presentationml/2006/main">
+  <p:cSld>
+    <p:spTree>
+      <p:nvGrpSpPr>
+        <p:cNvPr id="1" name=""/>
+        <p:cNvGrpSpPr/>
+        <p:nvPr/>
+      </p:nvGrpSpPr>
+      <p:grpSpPr>
+        <a:xfrm>
+          <a:off x="0" y="0"/>
+          <a:ext cx="0" cy="0"/>
+          <a:chOff x="0" y="0"/>
+          <a:chExt cx="0" cy="0"/>
+        </a:xfrm>
+      </p:grpSpPr>
+      <p:sp>
+        <p:nvSpPr>
+          <p:cNvPr id="6" name="Rectangle 5">
+            <a:extLst>
+              <a:ext uri="{FF2B5EF4-FFF2-40B4-BE49-F238E27FC236}">
+                <a16:creationId xmlns:a16="http://schemas.microsoft.com/office/drawing/2014/main" id="{CFCBECC7-7B6F-411D-9D10-F51EDF209551}"/>
+              </a:ext>
+            </a:extLst>
+          </p:cNvPr>
+          <p:cNvSpPr/>
+          <p:nvPr/>
+        </p:nvSpPr>
+        <p:spPr>
+          <a:xfrm>
+            <a:off x="1147082" y="738868"/>
+            <a:ext cx="9172575" cy="5833382"/>
+          </a:xfrm>
+          <a:prstGeom prst="rect">
+            <a:avLst/>
+          </a:prstGeom>
+        </p:spPr>
+        <p:style>
+          <a:lnRef idx="2">
+            <a:schemeClr val="accent1">
+              <a:shade val="50000"/>
+            </a:schemeClr>
+          </a:lnRef>
+          <a:fillRef idx="1">
+            <a:schemeClr val="accent1"/>
+          </a:fillRef>
+          <a:effectRef idx="0">
+            <a:schemeClr val="accent1"/>
+          </a:effectRef>
+          <a:fontRef idx="minor">
+            <a:schemeClr val="lt1"/>
+          </a:fontRef>
+        </p:style>
+        <p:txBody>
+          <a:bodyPr rtlCol="0" anchor="ctr"/>
+          <a:lstStyle/>
+          <a:p>
+            <a:pPr algn="ctr"/>
+            <a:endParaRPr lang="en-GB"/>
+          </a:p>
+        </p:txBody>
+      </p:sp>
+      <p:sp>
+        <p:nvSpPr>
+          <p:cNvPr id="9" name="Oval 8">
+            <a:extLst>
+              <a:ext uri="{FF2B5EF4-FFF2-40B4-BE49-F238E27FC236}">
+                <a16:creationId xmlns:a16="http://schemas.microsoft.com/office/drawing/2014/main" id="{2B000735-6B8F-4CC7-8446-F3F270A7CFF6}"/>
+              </a:ext>
+            </a:extLst>
+          </p:cNvPr>
+          <p:cNvSpPr/>
+          <p:nvPr/>
+        </p:nvSpPr>
+        <p:spPr>
+          <a:xfrm>
+            <a:off x="4184196" y="3694339"/>
+            <a:ext cx="379640" cy="326572"/>
+          </a:xfrm>
+          <a:prstGeom prst="ellipse">
+            <a:avLst/>
+          </a:prstGeom>
+          <a:solidFill>
+            <a:schemeClr val="bg1"/>
+          </a:solidFill>
+          <a:ln>
+            <a:noFill/>
+          </a:ln>
+        </p:spPr>
+        <p:style>
+          <a:lnRef idx="2">
+            <a:schemeClr val="accent1">
+              <a:shade val="50000"/>
+            </a:schemeClr>
+          </a:lnRef>
+          <a:fillRef idx="1">
+            <a:schemeClr val="accent1"/>
+          </a:fillRef>
+          <a:effectRef idx="0">
+            <a:schemeClr val="accent1"/>
+          </a:effectRef>
+          <a:fontRef idx="minor">
+            <a:schemeClr val="lt1"/>
+          </a:fontRef>
+        </p:style>
+        <p:txBody>
+          <a:bodyPr rtlCol="0" anchor="ctr"/>
+          <a:lstStyle/>
+          <a:p>
+            <a:pPr algn="ctr"/>
+            <a:endParaRPr lang="en-GB"/>
+          </a:p>
+        </p:txBody>
+      </p:sp>
+      <p:sp>
+        <p:nvSpPr>
+          <p:cNvPr id="10" name="Oval 9">
+            <a:extLst>
+              <a:ext uri="{FF2B5EF4-FFF2-40B4-BE49-F238E27FC236}">
+                <a16:creationId xmlns:a16="http://schemas.microsoft.com/office/drawing/2014/main" id="{C5685E09-78F1-461F-8D7B-F892C11C3068}"/>
+              </a:ext>
+            </a:extLst>
+          </p:cNvPr>
+          <p:cNvSpPr/>
+          <p:nvPr/>
+        </p:nvSpPr>
+        <p:spPr>
+          <a:xfrm>
+            <a:off x="5259160" y="3710668"/>
+            <a:ext cx="379640" cy="326572"/>
+          </a:xfrm>
+          <a:prstGeom prst="ellipse">
+            <a:avLst/>
+          </a:prstGeom>
+          <a:solidFill>
+            <a:schemeClr val="bg1"/>
+          </a:solidFill>
+          <a:ln>
+            <a:noFill/>
+          </a:ln>
+        </p:spPr>
+        <p:style>
+          <a:lnRef idx="2">
+            <a:schemeClr val="accent1">
+              <a:shade val="50000"/>
+            </a:schemeClr>
+          </a:lnRef>
+          <a:fillRef idx="1">
+            <a:schemeClr val="accent1"/>
+          </a:fillRef>
+          <a:effectRef idx="0">
+            <a:schemeClr val="accent1"/>
+          </a:effectRef>
+          <a:fontRef idx="minor">
+            <a:schemeClr val="lt1"/>
+          </a:fontRef>
+        </p:style>
+        <p:txBody>
+          <a:bodyPr rtlCol="0" anchor="ctr"/>
+          <a:lstStyle/>
+          <a:p>
+            <a:pPr algn="ctr"/>
+            <a:endParaRPr lang="en-GB"/>
+          </a:p>
+        </p:txBody>
+      </p:sp>
+      <p:sp>
+        <p:nvSpPr>
+          <p:cNvPr id="11" name="Oval 10">
+            <a:extLst>
+              <a:ext uri="{FF2B5EF4-FFF2-40B4-BE49-F238E27FC236}">
+                <a16:creationId xmlns:a16="http://schemas.microsoft.com/office/drawing/2014/main" id="{84A2BF55-5A5E-4A3C-AE42-6F4FB142A34A}"/>
+              </a:ext>
+            </a:extLst>
+          </p:cNvPr>
+          <p:cNvSpPr/>
+          <p:nvPr/>
+        </p:nvSpPr>
+        <p:spPr>
+          <a:xfrm>
+            <a:off x="5001986" y="2984046"/>
+            <a:ext cx="636814" cy="498022"/>
+          </a:xfrm>
+          <a:prstGeom prst="ellipse">
+            <a:avLst/>
+          </a:prstGeom>
+          <a:solidFill>
+            <a:schemeClr val="bg1"/>
+          </a:solidFill>
+          <a:ln>
+            <a:noFill/>
+          </a:ln>
+        </p:spPr>
+        <p:style>
+          <a:lnRef idx="2">
+            <a:schemeClr val="accent1">
+              <a:shade val="50000"/>
+            </a:schemeClr>
+          </a:lnRef>
+          <a:fillRef idx="1">
+            <a:schemeClr val="accent1"/>
+          </a:fillRef>
+          <a:effectRef idx="0">
+            <a:schemeClr val="accent1"/>
+          </a:effectRef>
+          <a:fontRef idx="minor">
+            <a:schemeClr val="lt1"/>
+          </a:fontRef>
+        </p:style>
+        <p:txBody>
+          <a:bodyPr rtlCol="0" anchor="ctr"/>
+          <a:lstStyle/>
+          <a:p>
+            <a:pPr algn="ctr"/>
+            <a:endParaRPr lang="en-GB"/>
+          </a:p>
+        </p:txBody>
+      </p:sp>
+      <p:sp>
+        <p:nvSpPr>
+          <p:cNvPr id="12" name="Oval 11">
+            <a:extLst>
+              <a:ext uri="{FF2B5EF4-FFF2-40B4-BE49-F238E27FC236}">
+                <a16:creationId xmlns:a16="http://schemas.microsoft.com/office/drawing/2014/main" id="{A421906B-A2B0-4D4C-B548-B44317C4DDA6}"/>
+              </a:ext>
+            </a:extLst>
+          </p:cNvPr>
+          <p:cNvSpPr/>
+          <p:nvPr/>
+        </p:nvSpPr>
+        <p:spPr>
+          <a:xfrm>
+            <a:off x="4017511" y="3057524"/>
+            <a:ext cx="636813" cy="653144"/>
+          </a:xfrm>
+          <a:prstGeom prst="ellipse">
+            <a:avLst/>
+          </a:prstGeom>
+          <a:solidFill>
+            <a:schemeClr val="bg1"/>
+          </a:solidFill>
+          <a:ln>
+            <a:noFill/>
+          </a:ln>
+        </p:spPr>
+        <p:style>
+          <a:lnRef idx="2">
+            <a:schemeClr val="accent1">
+              <a:shade val="50000"/>
+            </a:schemeClr>
+          </a:lnRef>
+          <a:fillRef idx="1">
+            <a:schemeClr val="accent1"/>
+          </a:fillRef>
+          <a:effectRef idx="0">
+            <a:schemeClr val="accent1"/>
+          </a:effectRef>
+          <a:fontRef idx="minor">
+            <a:schemeClr val="lt1"/>
+          </a:fontRef>
+        </p:style>
+        <p:txBody>
+          <a:bodyPr rtlCol="0" anchor="ctr"/>
+          <a:lstStyle/>
+          <a:p>
+            <a:pPr algn="ctr"/>
+            <a:endParaRPr lang="en-GB"/>
+          </a:p>
+        </p:txBody>
+      </p:sp>
+      <p:sp>
+        <p:nvSpPr>
+          <p:cNvPr id="13" name="Oval 12">
+            <a:extLst>
+              <a:ext uri="{FF2B5EF4-FFF2-40B4-BE49-F238E27FC236}">
+                <a16:creationId xmlns:a16="http://schemas.microsoft.com/office/drawing/2014/main" id="{AA938F19-0969-46FB-84DB-404A50D57D5E}"/>
+              </a:ext>
+            </a:extLst>
+          </p:cNvPr>
+          <p:cNvSpPr/>
+          <p:nvPr/>
+        </p:nvSpPr>
+        <p:spPr>
+          <a:xfrm>
+            <a:off x="3956277" y="3384096"/>
+            <a:ext cx="379640" cy="326572"/>
+          </a:xfrm>
+          <a:prstGeom prst="ellipse">
+            <a:avLst/>
+          </a:prstGeom>
+          <a:solidFill>
+            <a:schemeClr val="bg1"/>
+          </a:solidFill>
+          <a:ln>
+            <a:noFill/>
+          </a:ln>
+        </p:spPr>
+        <p:style>
+          <a:lnRef idx="2">
+            <a:schemeClr val="accent1">
+              <a:shade val="50000"/>
+            </a:schemeClr>
+          </a:lnRef>
+          <a:fillRef idx="1">
+            <a:schemeClr val="accent1"/>
+          </a:fillRef>
+          <a:effectRef idx="0">
+            <a:schemeClr val="accent1"/>
+          </a:effectRef>
+          <a:fontRef idx="minor">
+            <a:schemeClr val="lt1"/>
+          </a:fontRef>
+        </p:style>
+        <p:txBody>
+          <a:bodyPr rtlCol="0" anchor="ctr"/>
+          <a:lstStyle/>
+          <a:p>
+            <a:pPr algn="ctr"/>
+            <a:endParaRPr lang="en-GB"/>
+          </a:p>
+        </p:txBody>
+      </p:sp>
+      <p:pic>
+        <p:nvPicPr>
+          <p:cNvPr id="8" name="Picture 7" descr="A picture containing drawing&#10;&#10;Description automatically generated">
+            <a:extLst>
+              <a:ext uri="{FF2B5EF4-FFF2-40B4-BE49-F238E27FC236}">
+                <a16:creationId xmlns:a16="http://schemas.microsoft.com/office/drawing/2014/main" id="{A5A6209D-92D9-45CC-AC59-9B7A2669D144}"/>
+              </a:ext>
+            </a:extLst>
+          </p:cNvPr>
+          <p:cNvPicPr>
+            <a:picLocks noChangeAspect="1"/>
+          </p:cNvPicPr>
+          <p:nvPr/>
+        </p:nvPicPr>
+        <p:blipFill>
+          <a:blip r:embed="rId2">
+            <a:clrChange>
+              <a:clrFrom>
+                <a:srgbClr val="FFFFFF"/>
+              </a:clrFrom>
+              <a:clrTo>
+                <a:srgbClr val="FFFFFF">
+                  <a:alpha val="0"/>
+                </a:srgbClr>
+              </a:clrTo>
+            </a:clrChange>
+            <a:extLst>
+              <a:ext uri="{28A0092B-C50C-407E-A947-70E740481C1C}">
+                <a14:useLocalDpi xmlns:a14="http://schemas.microsoft.com/office/drawing/2010/main" val="0"/>
+              </a:ext>
+            </a:extLst>
+          </a:blip>
+          <a:stretch>
+            <a:fillRect/>
+          </a:stretch>
+        </p:blipFill>
+        <p:spPr>
+          <a:xfrm>
+            <a:off x="3854393" y="2330393"/>
+            <a:ext cx="2197213" cy="2197213"/>
+          </a:xfrm>
+          <a:prstGeom prst="rect">
+            <a:avLst/>
+          </a:prstGeom>
+        </p:spPr>
+      </p:pic>
+      <p:pic>
+        <p:nvPicPr>
+          <p:cNvPr id="14" name="Picture 13">
+            <a:extLst>
+              <a:ext uri="{FF2B5EF4-FFF2-40B4-BE49-F238E27FC236}">
+                <a16:creationId xmlns:a16="http://schemas.microsoft.com/office/drawing/2014/main" id="{B7BAE039-AE2A-4DAE-9178-55A899F1A556}"/>
+              </a:ext>
+            </a:extLst>
+          </p:cNvPr>
+          <p:cNvPicPr>
+            <a:picLocks noChangeAspect="1"/>
+          </p:cNvPicPr>
+          <p:nvPr/>
+        </p:nvPicPr>
+        <p:blipFill>
+          <a:blip r:embed="rId3"/>
+          <a:stretch>
+            <a:fillRect/>
+          </a:stretch>
+        </p:blipFill>
+        <p:spPr>
+          <a:xfrm>
+            <a:off x="3852576" y="2328576"/>
+            <a:ext cx="2200847" cy="2200847"/>
+          </a:xfrm>
+          <a:prstGeom prst="rect">
+            <a:avLst/>
+          </a:prstGeom>
+        </p:spPr>
+      </p:pic>
+      <p:pic>
+        <p:nvPicPr>
+          <p:cNvPr id="15" name="Picture 14">
+            <a:extLst>
+              <a:ext uri="{FF2B5EF4-FFF2-40B4-BE49-F238E27FC236}">
+                <a16:creationId xmlns:a16="http://schemas.microsoft.com/office/drawing/2014/main" id="{868F44AE-F1E4-45DF-86E6-5EDC30F6F344}"/>
+              </a:ext>
+            </a:extLst>
+          </p:cNvPr>
+          <p:cNvPicPr>
+            <a:picLocks noChangeAspect="1"/>
+          </p:cNvPicPr>
+          <p:nvPr/>
+        </p:nvPicPr>
+        <p:blipFill>
+          <a:blip r:embed="rId3"/>
+          <a:stretch>
+            <a:fillRect/>
+          </a:stretch>
+        </p:blipFill>
+        <p:spPr>
+          <a:xfrm>
+            <a:off x="6715519" y="2056433"/>
+            <a:ext cx="2200847" cy="2200847"/>
+          </a:xfrm>
+          <a:prstGeom prst="rect">
+            <a:avLst/>
+          </a:prstGeom>
+        </p:spPr>
+      </p:pic>
+    </p:spTree>
+    <p:extLst>
+      <p:ext uri="{BB962C8B-B14F-4D97-AF65-F5344CB8AC3E}">
+        <p14:creationId xmlns:p14="http://schemas.microsoft.com/office/powerpoint/2010/main" val="3758216428"/>
+      </p:ext>
+    </p:extLst>
+  </p:cSld>
+  <p:clrMapOvr>
+    <a:masterClrMapping/>
+  </p:clrMapOvr>
+</p:sld>
+</file>
+
+<file path=ppt/slides/slide4.xml><?xml version="1.0" encoding="utf-8"?>
+<p:sld xmlns:a="http://schemas.openxmlformats.org/drawingml/2006/main" xmlns:r="http://schemas.openxmlformats.org/officeDocument/2006/relationships" xmlns:p="http://schemas.openxmlformats.org/presentationml/2006/main">
+  <p:cSld>
+    <p:spTree>
+      <p:nvGrpSpPr>
+        <p:cNvPr id="1" name=""/>
+        <p:cNvGrpSpPr/>
+        <p:nvPr/>
+      </p:nvGrpSpPr>
+      <p:grpSpPr>
+        <a:xfrm>
+          <a:off x="0" y="0"/>
+          <a:ext cx="0" cy="0"/>
+          <a:chOff x="0" y="0"/>
+          <a:chExt cx="0" cy="0"/>
+        </a:xfrm>
+      </p:grpSpPr>
+    </p:spTree>
+    <p:extLst>
+      <p:ext uri="{BB962C8B-B14F-4D97-AF65-F5344CB8AC3E}">
+        <p14:creationId xmlns:p14="http://schemas.microsoft.com/office/powerpoint/2010/main" val="2710539114"/>
+      </p:ext>
+    </p:extLst>
+  </p:cSld>
+  <p:clrMapOvr>
+    <a:masterClrMapping/>
+  </p:clrMapOvr>
+</p:sld>
+</file>
+
 <file path=ppt/theme/theme1.xml><?xml version="1.0" encoding="utf-8"?>
 <a:theme xmlns:a="http://schemas.openxmlformats.org/drawingml/2006/main" name="Office Theme">
   <a:themeElements>

</xml_diff>